<commit_message>
Diagrama modelo araña de gerencia de la informática completado
</commit_message>
<xml_diff>
--- a/Marco legal para la ingeniería informática/Trabajo, exposición y ladbook/PTT, Exposición de Marco legal, Informática Intensivos IF01 T4.pptx.pptx
+++ b/Marco legal para la ingeniería informática/Trabajo, exposición y ladbook/PTT, Exposición de Marco legal, Informática Intensivos IF01 T4.pptx.pptx
@@ -244,7 +244,7 @@
           <a:p>
             <a:fld id="{B7268E1E-0E44-426D-905E-8AD9B19D2182}" type="datetimeFigureOut">
               <a:rPr lang="cs-CZ" smtClean="0"/>
-              <a:t>23.08.2025</a:t>
+              <a:t>24.08.2025</a:t>
             </a:fld>
             <a:endParaRPr lang="cs-CZ"/>
           </a:p>
@@ -4468,7 +4468,7 @@
             <a:fld id="{1D8BD707-D9CF-40AE-B4C6-C98DA3205C09}" type="datetimeFigureOut">
               <a:rPr lang="en-US" smtClean="0"/>
               <a:pPr/>
-              <a:t>8/23/2025</a:t>
+              <a:t>8/24/2025</a:t>
             </a:fld>
             <a:endParaRPr lang="en-US"/>
           </a:p>
@@ -4633,7 +4633,7 @@
             <a:fld id="{1D8BD707-D9CF-40AE-B4C6-C98DA3205C09}" type="datetimeFigureOut">
               <a:rPr lang="en-US" smtClean="0"/>
               <a:pPr/>
-              <a:t>8/23/2025</a:t>
+              <a:t>8/24/2025</a:t>
             </a:fld>
             <a:endParaRPr lang="en-US"/>
           </a:p>
@@ -4808,7 +4808,7 @@
             <a:fld id="{1D8BD707-D9CF-40AE-B4C6-C98DA3205C09}" type="datetimeFigureOut">
               <a:rPr lang="en-US" smtClean="0"/>
               <a:pPr/>
-              <a:t>8/23/2025</a:t>
+              <a:t>8/24/2025</a:t>
             </a:fld>
             <a:endParaRPr lang="en-US"/>
           </a:p>
@@ -4973,7 +4973,7 @@
             <a:fld id="{1D8BD707-D9CF-40AE-B4C6-C98DA3205C09}" type="datetimeFigureOut">
               <a:rPr lang="en-US" smtClean="0"/>
               <a:pPr/>
-              <a:t>8/23/2025</a:t>
+              <a:t>8/24/2025</a:t>
             </a:fld>
             <a:endParaRPr lang="en-US"/>
           </a:p>
@@ -5215,7 +5215,7 @@
             <a:fld id="{1D8BD707-D9CF-40AE-B4C6-C98DA3205C09}" type="datetimeFigureOut">
               <a:rPr lang="en-US" smtClean="0"/>
               <a:pPr/>
-              <a:t>8/23/2025</a:t>
+              <a:t>8/24/2025</a:t>
             </a:fld>
             <a:endParaRPr lang="en-US"/>
           </a:p>
@@ -5497,7 +5497,7 @@
             <a:fld id="{1D8BD707-D9CF-40AE-B4C6-C98DA3205C09}" type="datetimeFigureOut">
               <a:rPr lang="en-US" smtClean="0"/>
               <a:pPr/>
-              <a:t>8/23/2025</a:t>
+              <a:t>8/24/2025</a:t>
             </a:fld>
             <a:endParaRPr lang="en-US"/>
           </a:p>
@@ -5913,7 +5913,7 @@
             <a:fld id="{1D8BD707-D9CF-40AE-B4C6-C98DA3205C09}" type="datetimeFigureOut">
               <a:rPr lang="en-US" smtClean="0"/>
               <a:pPr/>
-              <a:t>8/23/2025</a:t>
+              <a:t>8/24/2025</a:t>
             </a:fld>
             <a:endParaRPr lang="en-US"/>
           </a:p>
@@ -6027,7 +6027,7 @@
             <a:fld id="{1D8BD707-D9CF-40AE-B4C6-C98DA3205C09}" type="datetimeFigureOut">
               <a:rPr lang="en-US" smtClean="0"/>
               <a:pPr/>
-              <a:t>8/23/2025</a:t>
+              <a:t>8/24/2025</a:t>
             </a:fld>
             <a:endParaRPr lang="en-US"/>
           </a:p>
@@ -6119,7 +6119,7 @@
             <a:fld id="{1D8BD707-D9CF-40AE-B4C6-C98DA3205C09}" type="datetimeFigureOut">
               <a:rPr lang="en-US" smtClean="0"/>
               <a:pPr/>
-              <a:t>8/23/2025</a:t>
+              <a:t>8/24/2025</a:t>
             </a:fld>
             <a:endParaRPr lang="en-US"/>
           </a:p>
@@ -6391,7 +6391,7 @@
             <a:fld id="{1D8BD707-D9CF-40AE-B4C6-C98DA3205C09}" type="datetimeFigureOut">
               <a:rPr lang="en-US" smtClean="0"/>
               <a:pPr/>
-              <a:t>8/23/2025</a:t>
+              <a:t>8/24/2025</a:t>
             </a:fld>
             <a:endParaRPr lang="en-US"/>
           </a:p>
@@ -6640,7 +6640,7 @@
             <a:fld id="{1D8BD707-D9CF-40AE-B4C6-C98DA3205C09}" type="datetimeFigureOut">
               <a:rPr lang="en-US" smtClean="0"/>
               <a:pPr/>
-              <a:t>8/23/2025</a:t>
+              <a:t>8/24/2025</a:t>
             </a:fld>
             <a:endParaRPr lang="en-US"/>
           </a:p>
@@ -6848,7 +6848,7 @@
             <a:fld id="{1D8BD707-D9CF-40AE-B4C6-C98DA3205C09}" type="datetimeFigureOut">
               <a:rPr lang="en-US" smtClean="0"/>
               <a:pPr/>
-              <a:t>8/23/2025</a:t>
+              <a:t>8/24/2025</a:t>
             </a:fld>
             <a:endParaRPr lang="en-US"/>
           </a:p>
@@ -8489,13 +8489,13 @@
   <p:clrMapOvr>
     <a:masterClrMapping/>
   </p:clrMapOvr>
-  <mc:AlternateContent xmlns:mc="http://schemas.openxmlformats.org/markup-compatibility/2006">
-    <mc:Choice xmlns:p14="http://schemas.microsoft.com/office/powerpoint/2010/main" Requires="p14">
+  <mc:AlternateContent xmlns:mc="http://schemas.openxmlformats.org/markup-compatibility/2006" xmlns:p14="http://schemas.microsoft.com/office/powerpoint/2010/main">
+    <mc:Choice Requires="p14">
       <p:transition spd="slow" p14:dur="900">
         <p14:warp dir="in"/>
       </p:transition>
     </mc:Choice>
-    <mc:Fallback>
+    <mc:Fallback xmlns="">
       <p:transition spd="slow">
         <p:fade/>
       </p:transition>
@@ -23638,7 +23638,7 @@
                   <a:cs typeface="Montserrat Bold"/>
                   <a:sym typeface="Montserrat Bold"/>
                 </a:rPr>
-                <a:t> de la </a:t>
+                <a:t> del </a:t>
               </a:r>
               <a:r>
                 <a:rPr lang="en-US" sz="2600" b="1" spc="31" dirty="0" err="1">
@@ -23650,7 +23650,7 @@
                   <a:cs typeface="Montserrat Bold"/>
                   <a:sym typeface="Montserrat Bold"/>
                 </a:rPr>
-                <a:t>autoría</a:t>
+                <a:t>autor</a:t>
               </a:r>
               <a:endParaRPr lang="en-US" sz="2600" b="1" spc="31" dirty="0">
                 <a:solidFill>
@@ -24274,180 +24274,6 @@
                 </a:rPr>
                 <a:t>:</a:t>
               </a:r>
-            </a:p>
-          </p:txBody>
-        </p:sp>
-      </p:grpSp>
-      <p:grpSp>
-        <p:nvGrpSpPr>
-          <p:cNvPr id="30" name="Group 30"/>
-          <p:cNvGrpSpPr/>
-          <p:nvPr/>
-        </p:nvGrpSpPr>
-        <p:grpSpPr>
-          <a:xfrm>
-            <a:off x="7210831" y="8397331"/>
-            <a:ext cx="3866338" cy="1520759"/>
-            <a:chOff x="0" y="0"/>
-            <a:chExt cx="5155118" cy="2027679"/>
-          </a:xfrm>
-        </p:grpSpPr>
-        <p:sp>
-          <p:nvSpPr>
-            <p:cNvPr id="31" name="Freeform 31"/>
-            <p:cNvSpPr/>
-            <p:nvPr/>
-          </p:nvSpPr>
-          <p:spPr>
-            <a:xfrm>
-              <a:off x="0" y="0"/>
-              <a:ext cx="5155118" cy="2027679"/>
-            </a:xfrm>
-            <a:custGeom>
-              <a:avLst/>
-              <a:gdLst/>
-              <a:ahLst/>
-              <a:cxnLst/>
-              <a:rect l="l" t="t" r="r" b="b"/>
-              <a:pathLst>
-                <a:path w="5155118" h="2027679">
-                  <a:moveTo>
-                    <a:pt x="1013839" y="0"/>
-                  </a:moveTo>
-                  <a:lnTo>
-                    <a:pt x="4141279" y="0"/>
-                  </a:lnTo>
-                  <a:cubicBezTo>
-                    <a:pt x="4701206" y="0"/>
-                    <a:pt x="5155118" y="453911"/>
-                    <a:pt x="5155118" y="1013839"/>
-                  </a:cubicBezTo>
-                  <a:lnTo>
-                    <a:pt x="5155118" y="1013839"/>
-                  </a:lnTo>
-                  <a:cubicBezTo>
-                    <a:pt x="5155118" y="1282726"/>
-                    <a:pt x="5048303" y="1540600"/>
-                    <a:pt x="4858171" y="1730732"/>
-                  </a:cubicBezTo>
-                  <a:cubicBezTo>
-                    <a:pt x="4668039" y="1920864"/>
-                    <a:pt x="4410165" y="2027679"/>
-                    <a:pt x="4141279" y="2027679"/>
-                  </a:cubicBezTo>
-                  <a:lnTo>
-                    <a:pt x="1013839" y="2027679"/>
-                  </a:lnTo>
-                  <a:cubicBezTo>
-                    <a:pt x="744952" y="2027679"/>
-                    <a:pt x="487078" y="1920864"/>
-                    <a:pt x="296947" y="1730732"/>
-                  </a:cubicBezTo>
-                  <a:cubicBezTo>
-                    <a:pt x="106815" y="1540600"/>
-                    <a:pt x="0" y="1282726"/>
-                    <a:pt x="0" y="1013839"/>
-                  </a:cubicBezTo>
-                  <a:lnTo>
-                    <a:pt x="0" y="1013839"/>
-                  </a:lnTo>
-                  <a:cubicBezTo>
-                    <a:pt x="0" y="744952"/>
-                    <a:pt x="106815" y="487078"/>
-                    <a:pt x="296947" y="296947"/>
-                  </a:cubicBezTo>
-                  <a:cubicBezTo>
-                    <a:pt x="487078" y="106815"/>
-                    <a:pt x="744952" y="0"/>
-                    <a:pt x="1013839" y="0"/>
-                  </a:cubicBezTo>
-                  <a:close/>
-                </a:path>
-              </a:pathLst>
-            </a:custGeom>
-            <a:solidFill>
-              <a:srgbClr val="000000">
-                <a:alpha val="0"/>
-              </a:srgbClr>
-            </a:solidFill>
-            <a:ln w="95250" cap="rnd">
-              <a:solidFill>
-                <a:srgbClr val="66A1CB"/>
-              </a:solidFill>
-              <a:prstDash val="solid"/>
-              <a:round/>
-            </a:ln>
-          </p:spPr>
-        </p:sp>
-        <p:sp>
-          <p:nvSpPr>
-            <p:cNvPr id="32" name="TextBox 32"/>
-            <p:cNvSpPr txBox="1"/>
-            <p:nvPr/>
-          </p:nvSpPr>
-          <p:spPr>
-            <a:xfrm>
-              <a:off x="0" y="28575"/>
-              <a:ext cx="5155118" cy="1999104"/>
-            </a:xfrm>
-            <a:prstGeom prst="rect">
-              <a:avLst/>
-            </a:prstGeom>
-          </p:spPr>
-          <p:txBody>
-            <a:bodyPr lIns="254000" tIns="254000" rIns="254000" bIns="254000" rtlCol="0" anchor="ctr"/>
-            <a:lstStyle/>
-            <a:p>
-              <a:pPr algn="ctr">
-                <a:lnSpc>
-                  <a:spcPts val="2860"/>
-                </a:lnSpc>
-              </a:pPr>
-              <a:r>
-                <a:rPr lang="en-US" sz="2600" b="1" spc="31" dirty="0" err="1">
-                  <a:solidFill>
-                    <a:srgbClr val="000000"/>
-                  </a:solidFill>
-                  <a:latin typeface="Montserrat Bold"/>
-                  <a:ea typeface="Montserrat Bold"/>
-                  <a:cs typeface="Montserrat Bold"/>
-                  <a:sym typeface="Montserrat Bold"/>
-                </a:rPr>
-                <a:t>Arrepentimiento</a:t>
-              </a:r>
-              <a:r>
-                <a:rPr lang="en-US" sz="2600" b="1" spc="31" dirty="0">
-                  <a:solidFill>
-                    <a:srgbClr val="000000"/>
-                  </a:solidFill>
-                  <a:latin typeface="Montserrat Bold"/>
-                  <a:ea typeface="Montserrat Bold"/>
-                  <a:cs typeface="Montserrat Bold"/>
-                  <a:sym typeface="Montserrat Bold"/>
-                </a:rPr>
-                <a:t> o </a:t>
-              </a:r>
-              <a:r>
-                <a:rPr lang="en-US" sz="2600" b="1" spc="31" dirty="0" err="1">
-                  <a:solidFill>
-                    <a:srgbClr val="000000"/>
-                  </a:solidFill>
-                  <a:latin typeface="Montserrat Bold"/>
-                  <a:ea typeface="Montserrat Bold"/>
-                  <a:cs typeface="Montserrat Bold"/>
-                  <a:sym typeface="Montserrat Bold"/>
-                </a:rPr>
-                <a:t>retracto</a:t>
-              </a:r>
-              <a:endParaRPr lang="en-US" sz="2600" b="1" spc="31" dirty="0">
-                <a:solidFill>
-                  <a:srgbClr val="000000"/>
-                </a:solidFill>
-                <a:latin typeface="Montserrat Bold"/>
-                <a:ea typeface="Montserrat Bold"/>
-                <a:cs typeface="Montserrat Bold"/>
-                <a:sym typeface="Montserrat Bold"/>
-              </a:endParaRPr>
             </a:p>
           </p:txBody>
         </p:sp>
@@ -25210,9 +25036,9 @@
                                 </p:cTn>
                               </p:par>
                               <p:par>
-                                <p:cTn id="40" presetID="2" presetClass="entr" presetSubtype="4" fill="hold" nodeType="withEffect">
+                                <p:cTn id="40" presetID="2" presetClass="entr" presetSubtype="2" fill="hold" nodeType="withEffect">
                                   <p:stCondLst>
-                                    <p:cond delay="2250"/>
+                                    <p:cond delay="0"/>
                                   </p:stCondLst>
                                   <p:childTnLst>
                                     <p:set>
@@ -25223,7 +25049,7 @@
                                           </p:stCondLst>
                                         </p:cTn>
                                         <p:tgtEl>
-                                          <p:spTgt spid="30"/>
+                                          <p:spTgt spid="21"/>
                                         </p:tgtEl>
                                         <p:attrNameLst>
                                           <p:attrName>style.visibility</p:attrName>
@@ -25237,7 +25063,7 @@
                                       <p:cBhvr additive="base">
                                         <p:cTn id="42" dur="500" fill="hold"/>
                                         <p:tgtEl>
-                                          <p:spTgt spid="30"/>
+                                          <p:spTgt spid="21"/>
                                         </p:tgtEl>
                                         <p:attrNameLst>
                                           <p:attrName>ppt_x</p:attrName>
@@ -25246,7 +25072,7 @@
                                       <p:tavLst>
                                         <p:tav tm="0">
                                           <p:val>
-                                            <p:strVal val="#ppt_x"/>
+                                            <p:strVal val="1+#ppt_w/2"/>
                                           </p:val>
                                         </p:tav>
                                         <p:tav tm="100000">
@@ -25260,7 +25086,7 @@
                                       <p:cBhvr additive="base">
                                         <p:cTn id="43" dur="500" fill="hold"/>
                                         <p:tgtEl>
-                                          <p:spTgt spid="30"/>
+                                          <p:spTgt spid="21"/>
                                         </p:tgtEl>
                                         <p:attrNameLst>
                                           <p:attrName>ppt_y</p:attrName>
@@ -25269,7 +25095,7 @@
                                       <p:tavLst>
                                         <p:tav tm="0">
                                           <p:val>
-                                            <p:strVal val="1+#ppt_h/2"/>
+                                            <p:strVal val="#ppt_y"/>
                                           </p:val>
                                         </p:tav>
                                         <p:tav tm="100000">
@@ -25283,9 +25109,9 @@
                                 </p:cTn>
                               </p:par>
                               <p:par>
-                                <p:cTn id="44" presetID="2" presetClass="entr" presetSubtype="2" fill="hold" nodeType="withEffect">
+                                <p:cTn id="44" presetID="2" presetClass="entr" presetSubtype="4" fill="hold" nodeType="withEffect">
                                   <p:stCondLst>
-                                    <p:cond delay="0"/>
+                                    <p:cond delay="2000"/>
                                   </p:stCondLst>
                                   <p:childTnLst>
                                     <p:set>
@@ -25296,7 +25122,7 @@
                                           </p:stCondLst>
                                         </p:cTn>
                                         <p:tgtEl>
-                                          <p:spTgt spid="21"/>
+                                          <p:spTgt spid="24"/>
                                         </p:tgtEl>
                                         <p:attrNameLst>
                                           <p:attrName>style.visibility</p:attrName>
@@ -25310,7 +25136,7 @@
                                       <p:cBhvr additive="base">
                                         <p:cTn id="46" dur="500" fill="hold"/>
                                         <p:tgtEl>
-                                          <p:spTgt spid="21"/>
+                                          <p:spTgt spid="24"/>
                                         </p:tgtEl>
                                         <p:attrNameLst>
                                           <p:attrName>ppt_x</p:attrName>
@@ -25319,7 +25145,7 @@
                                       <p:tavLst>
                                         <p:tav tm="0">
                                           <p:val>
-                                            <p:strVal val="1+#ppt_w/2"/>
+                                            <p:strVal val="#ppt_x"/>
                                           </p:val>
                                         </p:tav>
                                         <p:tav tm="100000">
@@ -25332,79 +25158,6 @@
                                     <p:anim calcmode="lin" valueType="num">
                                       <p:cBhvr additive="base">
                                         <p:cTn id="47" dur="500" fill="hold"/>
-                                        <p:tgtEl>
-                                          <p:spTgt spid="21"/>
-                                        </p:tgtEl>
-                                        <p:attrNameLst>
-                                          <p:attrName>ppt_y</p:attrName>
-                                        </p:attrNameLst>
-                                      </p:cBhvr>
-                                      <p:tavLst>
-                                        <p:tav tm="0">
-                                          <p:val>
-                                            <p:strVal val="#ppt_y"/>
-                                          </p:val>
-                                        </p:tav>
-                                        <p:tav tm="100000">
-                                          <p:val>
-                                            <p:strVal val="#ppt_y"/>
-                                          </p:val>
-                                        </p:tav>
-                                      </p:tavLst>
-                                    </p:anim>
-                                  </p:childTnLst>
-                                </p:cTn>
-                              </p:par>
-                              <p:par>
-                                <p:cTn id="48" presetID="2" presetClass="entr" presetSubtype="4" fill="hold" nodeType="withEffect">
-                                  <p:stCondLst>
-                                    <p:cond delay="2000"/>
-                                  </p:stCondLst>
-                                  <p:childTnLst>
-                                    <p:set>
-                                      <p:cBhvr>
-                                        <p:cTn id="49" dur="1" fill="hold">
-                                          <p:stCondLst>
-                                            <p:cond delay="0"/>
-                                          </p:stCondLst>
-                                        </p:cTn>
-                                        <p:tgtEl>
-                                          <p:spTgt spid="24"/>
-                                        </p:tgtEl>
-                                        <p:attrNameLst>
-                                          <p:attrName>style.visibility</p:attrName>
-                                        </p:attrNameLst>
-                                      </p:cBhvr>
-                                      <p:to>
-                                        <p:strVal val="visible"/>
-                                      </p:to>
-                                    </p:set>
-                                    <p:anim calcmode="lin" valueType="num">
-                                      <p:cBhvr additive="base">
-                                        <p:cTn id="50" dur="500" fill="hold"/>
-                                        <p:tgtEl>
-                                          <p:spTgt spid="24"/>
-                                        </p:tgtEl>
-                                        <p:attrNameLst>
-                                          <p:attrName>ppt_x</p:attrName>
-                                        </p:attrNameLst>
-                                      </p:cBhvr>
-                                      <p:tavLst>
-                                        <p:tav tm="0">
-                                          <p:val>
-                                            <p:strVal val="#ppt_x"/>
-                                          </p:val>
-                                        </p:tav>
-                                        <p:tav tm="100000">
-                                          <p:val>
-                                            <p:strVal val="#ppt_x"/>
-                                          </p:val>
-                                        </p:tav>
-                                      </p:tavLst>
-                                    </p:anim>
-                                    <p:anim calcmode="lin" valueType="num">
-                                      <p:cBhvr additive="base">
-                                        <p:cTn id="51" dur="500" fill="hold"/>
                                         <p:tgtEl>
                                           <p:spTgt spid="24"/>
                                         </p:tgtEl>
@@ -28789,13 +28542,13 @@
   <p:clrMapOvr>
     <a:masterClrMapping/>
   </p:clrMapOvr>
-  <mc:AlternateContent xmlns:mc="http://schemas.openxmlformats.org/markup-compatibility/2006">
-    <mc:Choice xmlns:p14="http://schemas.microsoft.com/office/powerpoint/2010/main" Requires="p14">
+  <mc:AlternateContent xmlns:mc="http://schemas.openxmlformats.org/markup-compatibility/2006" xmlns:p14="http://schemas.microsoft.com/office/powerpoint/2010/main">
+    <mc:Choice Requires="p14">
       <p:transition spd="slow">
         <p14:window dir="vert"/>
       </p:transition>
     </mc:Choice>
-    <mc:Fallback>
+    <mc:Fallback xmlns="">
       <p:transition spd="slow">
         <p:fade/>
       </p:transition>

</xml_diff>